<commit_message>
Adding iteration 2 changes
</commit_message>
<xml_diff>
--- a/Iteration2 Documents/NOT FINISHED - Iteration 2 Slides.pptx
+++ b/Iteration2 Documents/NOT FINISHED - Iteration 2 Slides.pptx
@@ -7193,7 +7193,7 @@
             </a:pPr>
             <a:r>
               <a:rPr lang="en"/>
-              <a:t>Website</a:t>
+              <a:t>Website &amp; GIT</a:t>
             </a:r>
             <a:endParaRPr/>
           </a:p>
@@ -7249,6 +7249,10 @@
               <a:buNone/>
             </a:pPr>
             <a:r>
+              <a:rPr lang="en"/>
+              <a:t>Website - </a:t>
+            </a:r>
+            <a:r>
               <a:rPr lang="en" u="sng">
                 <a:solidFill>
                   <a:schemeClr val="hlink"/>
@@ -7256,6 +7260,46 @@
                 <a:hlinkClick r:id="rId4"/>
               </a:rPr>
               <a:t>https://runtimeterrorbu.github.io/Nozama/</a:t>
+            </a:r>
+            <a:endParaRPr/>
+          </a:p>
+          <a:p>
+            <a:pPr indent="0" lvl="0" marL="0" rtl="0" algn="l">
+              <a:spcBef>
+                <a:spcPts val="1200"/>
+              </a:spcBef>
+              <a:spcAft>
+                <a:spcPts val="0"/>
+              </a:spcAft>
+              <a:buNone/>
+            </a:pPr>
+            <a:r>
+              <a:t/>
+            </a:r>
+            <a:endParaRPr/>
+          </a:p>
+          <a:p>
+            <a:pPr indent="0" lvl="0" marL="0" rtl="0" algn="l">
+              <a:spcBef>
+                <a:spcPts val="1200"/>
+              </a:spcBef>
+              <a:spcAft>
+                <a:spcPts val="0"/>
+              </a:spcAft>
+              <a:buNone/>
+            </a:pPr>
+            <a:r>
+              <a:rPr lang="en"/>
+              <a:t>GIT - </a:t>
+            </a:r>
+            <a:r>
+              <a:rPr lang="en" u="sng">
+                <a:solidFill>
+                  <a:schemeClr val="hlink"/>
+                </a:solidFill>
+                <a:hlinkClick r:id="rId5"/>
+              </a:rPr>
+              <a:t>https://github.com/RuntimeTerrorBU/Nozama</a:t>
             </a:r>
             <a:endParaRPr/>
           </a:p>
@@ -7525,356 +7569,12 @@
         <p:nvSpPr>
           <p:cNvPr id="66" name="Google Shape;66;p14"/>
           <p:cNvSpPr txBox="1"/>
-          <p:nvPr>
-            <p:ph idx="1" type="body"/>
-          </p:nvPr>
-        </p:nvSpPr>
-        <p:spPr>
-          <a:xfrm>
-            <a:off x="311700" y="951800"/>
-            <a:ext cx="4414800" cy="3868500"/>
-          </a:xfrm>
-          <a:prstGeom prst="rect">
-            <a:avLst/>
-          </a:prstGeom>
-        </p:spPr>
-        <p:txBody>
-          <a:bodyPr anchorCtr="0" anchor="t" bIns="91425" lIns="91425" spcFirstLastPara="1" rIns="91425" wrap="square" tIns="91425">
-            <a:noAutofit/>
-          </a:bodyPr>
-          <a:lstStyle/>
-          <a:p>
-            <a:pPr indent="0" lvl="0" marL="0" rtl="0" algn="l">
-              <a:lnSpc>
-                <a:spcPct val="80000"/>
-              </a:lnSpc>
-              <a:spcBef>
-                <a:spcPts val="0"/>
-              </a:spcBef>
-              <a:spcAft>
-                <a:spcPts val="0"/>
-              </a:spcAft>
-              <a:buSzPts val="1018"/>
-              <a:buNone/>
-            </a:pPr>
-            <a:r>
-              <a:rPr lang="en" sz="1400"/>
-              <a:t>Ashley-</a:t>
-            </a:r>
-            <a:endParaRPr sz="1400"/>
-          </a:p>
-          <a:p>
-            <a:pPr indent="-317500" lvl="0" marL="457200" rtl="0" algn="l">
-              <a:lnSpc>
-                <a:spcPct val="80000"/>
-              </a:lnSpc>
-              <a:spcBef>
-                <a:spcPts val="1200"/>
-              </a:spcBef>
-              <a:spcAft>
-                <a:spcPts val="0"/>
-              </a:spcAft>
-              <a:buSzPts val="1400"/>
-              <a:buChar char="●"/>
-            </a:pPr>
-            <a:r>
-              <a:rPr lang="en" sz="1400"/>
-              <a:t>Gantt Chart</a:t>
-            </a:r>
-            <a:endParaRPr sz="1400"/>
-          </a:p>
-          <a:p>
-            <a:pPr indent="-317500" lvl="0" marL="457200" rtl="0" algn="l">
-              <a:lnSpc>
-                <a:spcPct val="80000"/>
-              </a:lnSpc>
-              <a:spcBef>
-                <a:spcPts val="0"/>
-              </a:spcBef>
-              <a:spcAft>
-                <a:spcPts val="0"/>
-              </a:spcAft>
-              <a:buSzPts val="1400"/>
-              <a:buChar char="●"/>
-            </a:pPr>
-            <a:r>
-              <a:rPr lang="en" sz="1400"/>
-              <a:t>Presentation</a:t>
-            </a:r>
-            <a:endParaRPr sz="1400"/>
-          </a:p>
-          <a:p>
-            <a:pPr indent="-317500" lvl="0" marL="457200" rtl="0" algn="l">
-              <a:lnSpc>
-                <a:spcPct val="80000"/>
-              </a:lnSpc>
-              <a:spcBef>
-                <a:spcPts val="0"/>
-              </a:spcBef>
-              <a:spcAft>
-                <a:spcPts val="0"/>
-              </a:spcAft>
-              <a:buSzPts val="1400"/>
-              <a:buChar char="●"/>
-            </a:pPr>
-            <a:r>
-              <a:rPr lang="en" sz="1400"/>
-              <a:t>Sale &amp; Customer classes</a:t>
-            </a:r>
-            <a:endParaRPr sz="1400"/>
-          </a:p>
-          <a:p>
-            <a:pPr indent="0" lvl="0" marL="0" rtl="0" algn="l">
-              <a:lnSpc>
-                <a:spcPct val="80000"/>
-              </a:lnSpc>
-              <a:spcBef>
-                <a:spcPts val="1200"/>
-              </a:spcBef>
-              <a:spcAft>
-                <a:spcPts val="0"/>
-              </a:spcAft>
-              <a:buSzPts val="1018"/>
-              <a:buNone/>
-            </a:pPr>
-            <a:r>
-              <a:rPr lang="en" sz="1400"/>
-              <a:t>Joshua-</a:t>
-            </a:r>
-            <a:endParaRPr sz="1400"/>
-          </a:p>
-          <a:p>
-            <a:pPr indent="-317500" lvl="0" marL="457200" rtl="0" algn="l">
-              <a:lnSpc>
-                <a:spcPct val="80000"/>
-              </a:lnSpc>
-              <a:spcBef>
-                <a:spcPts val="1200"/>
-              </a:spcBef>
-              <a:spcAft>
-                <a:spcPts val="0"/>
-              </a:spcAft>
-              <a:buSzPts val="1400"/>
-              <a:buChar char="●"/>
-            </a:pPr>
-            <a:r>
-              <a:rPr lang="en" sz="1400"/>
-              <a:t>Maven Project &amp; Configuration</a:t>
-            </a:r>
-            <a:endParaRPr sz="1400"/>
-          </a:p>
-          <a:p>
-            <a:pPr indent="-317500" lvl="0" marL="457200" rtl="0" algn="l">
-              <a:lnSpc>
-                <a:spcPct val="80000"/>
-              </a:lnSpc>
-              <a:spcBef>
-                <a:spcPts val="0"/>
-              </a:spcBef>
-              <a:spcAft>
-                <a:spcPts val="0"/>
-              </a:spcAft>
-              <a:buSzPts val="1400"/>
-              <a:buChar char="●"/>
-            </a:pPr>
-            <a:r>
-              <a:rPr lang="en" sz="1400"/>
-              <a:t>Presentation</a:t>
-            </a:r>
-            <a:endParaRPr sz="1400"/>
-          </a:p>
-          <a:p>
-            <a:pPr indent="-317500" lvl="0" marL="457200" rtl="0" algn="l">
-              <a:lnSpc>
-                <a:spcPct val="80000"/>
-              </a:lnSpc>
-              <a:spcBef>
-                <a:spcPts val="0"/>
-              </a:spcBef>
-              <a:spcAft>
-                <a:spcPts val="0"/>
-              </a:spcAft>
-              <a:buSzPts val="1400"/>
-              <a:buChar char="●"/>
-            </a:pPr>
-            <a:r>
-              <a:rPr lang="en" sz="1400"/>
-              <a:t>PaymentInfo &amp; SalesLineItem classes</a:t>
-            </a:r>
-            <a:endParaRPr sz="1400"/>
-          </a:p>
-          <a:p>
-            <a:pPr indent="0" lvl="0" marL="0" rtl="0" algn="l">
-              <a:lnSpc>
-                <a:spcPct val="80000"/>
-              </a:lnSpc>
-              <a:spcBef>
-                <a:spcPts val="1200"/>
-              </a:spcBef>
-              <a:spcAft>
-                <a:spcPts val="0"/>
-              </a:spcAft>
-              <a:buSzPts val="1018"/>
-              <a:buNone/>
-            </a:pPr>
-            <a:r>
-              <a:rPr lang="en" sz="1400"/>
-              <a:t>Austin- </a:t>
-            </a:r>
-            <a:endParaRPr sz="1400"/>
-          </a:p>
-          <a:p>
-            <a:pPr indent="-317500" lvl="0" marL="457200" rtl="0" algn="l">
-              <a:lnSpc>
-                <a:spcPct val="80000"/>
-              </a:lnSpc>
-              <a:spcBef>
-                <a:spcPts val="1200"/>
-              </a:spcBef>
-              <a:spcAft>
-                <a:spcPts val="0"/>
-              </a:spcAft>
-              <a:buSzPts val="1400"/>
-              <a:buChar char="●"/>
-            </a:pPr>
-            <a:r>
-              <a:rPr lang="en" sz="1400"/>
-              <a:t>Implement JUnit tests</a:t>
-            </a:r>
-            <a:endParaRPr sz="1400"/>
-          </a:p>
-          <a:p>
-            <a:pPr indent="-317500" lvl="0" marL="457200" rtl="0" algn="l">
-              <a:lnSpc>
-                <a:spcPct val="80000"/>
-              </a:lnSpc>
-              <a:spcBef>
-                <a:spcPts val="0"/>
-              </a:spcBef>
-              <a:spcAft>
-                <a:spcPts val="0"/>
-              </a:spcAft>
-              <a:buSzPts val="1400"/>
-              <a:buChar char="●"/>
-            </a:pPr>
-            <a:r>
-              <a:rPr lang="en" sz="1400"/>
-              <a:t>Swing GUI Lead</a:t>
-            </a:r>
-            <a:endParaRPr b="1" sz="1400" u="sng"/>
-          </a:p>
-          <a:p>
-            <a:pPr indent="-317500" lvl="0" marL="457200" rtl="0" algn="l">
-              <a:lnSpc>
-                <a:spcPct val="80000"/>
-              </a:lnSpc>
-              <a:spcBef>
-                <a:spcPts val="0"/>
-              </a:spcBef>
-              <a:spcAft>
-                <a:spcPts val="0"/>
-              </a:spcAft>
-              <a:buSzPts val="1400"/>
-              <a:buChar char="●"/>
-            </a:pPr>
-            <a:r>
-              <a:rPr lang="en" sz="1400"/>
-              <a:t>ShoppingCart &amp; Item classes</a:t>
-            </a:r>
-            <a:endParaRPr sz="1400"/>
-          </a:p>
-          <a:p>
-            <a:pPr indent="0" lvl="0" marL="0" rtl="0" algn="l">
-              <a:lnSpc>
-                <a:spcPct val="80000"/>
-              </a:lnSpc>
-              <a:spcBef>
-                <a:spcPts val="1200"/>
-              </a:spcBef>
-              <a:spcAft>
-                <a:spcPts val="0"/>
-              </a:spcAft>
-              <a:buSzPts val="1018"/>
-              <a:buNone/>
-            </a:pPr>
-            <a:r>
-              <a:rPr lang="en" sz="1400"/>
-              <a:t>Tyler- </a:t>
-            </a:r>
-            <a:endParaRPr sz="1400"/>
-          </a:p>
-          <a:p>
-            <a:pPr indent="-317500" lvl="0" marL="457200" rtl="0" algn="l">
-              <a:lnSpc>
-                <a:spcPct val="80000"/>
-              </a:lnSpc>
-              <a:spcBef>
-                <a:spcPts val="1200"/>
-              </a:spcBef>
-              <a:spcAft>
-                <a:spcPts val="0"/>
-              </a:spcAft>
-              <a:buSzPts val="1400"/>
-              <a:buChar char="●"/>
-            </a:pPr>
-            <a:r>
-              <a:rPr lang="en" sz="1400"/>
-              <a:t>Implement JUnit test</a:t>
-            </a:r>
-            <a:endParaRPr sz="1400"/>
-          </a:p>
-          <a:p>
-            <a:pPr indent="-317500" lvl="0" marL="457200" rtl="0" algn="l">
-              <a:lnSpc>
-                <a:spcPct val="80000"/>
-              </a:lnSpc>
-              <a:spcBef>
-                <a:spcPts val="0"/>
-              </a:spcBef>
-              <a:spcAft>
-                <a:spcPts val="0"/>
-              </a:spcAft>
-              <a:buSzPts val="1400"/>
-              <a:buChar char="●"/>
-            </a:pPr>
-            <a:r>
-              <a:rPr lang="en" sz="1400"/>
-              <a:t>ProductCatalog &amp; ProductSpecification classes</a:t>
-            </a:r>
-            <a:endParaRPr sz="1400"/>
-          </a:p>
-          <a:p>
-            <a:pPr indent="-317500" lvl="0" marL="457200" rtl="0" algn="l">
-              <a:lnSpc>
-                <a:spcPct val="80000"/>
-              </a:lnSpc>
-              <a:spcBef>
-                <a:spcPts val="0"/>
-              </a:spcBef>
-              <a:spcAft>
-                <a:spcPts val="0"/>
-              </a:spcAft>
-              <a:buSzPts val="1400"/>
-              <a:buChar char="●"/>
-            </a:pPr>
-            <a:r>
-              <a:rPr lang="en" sz="1400"/>
-              <a:t>Package Diagram</a:t>
-            </a:r>
-            <a:endParaRPr sz="1400"/>
-          </a:p>
-        </p:txBody>
-      </p:sp>
-      <p:sp>
-        <p:nvSpPr>
-          <p:cNvPr id="67" name="Google Shape;67;p14"/>
-          <p:cNvSpPr txBox="1"/>
           <p:nvPr/>
         </p:nvSpPr>
         <p:spPr>
           <a:xfrm>
-            <a:off x="4774300" y="1131350"/>
-            <a:ext cx="5208300" cy="1847100"/>
+            <a:off x="549200" y="1131350"/>
+            <a:ext cx="3305700" cy="1847100"/>
           </a:xfrm>
           <a:prstGeom prst="rect">
             <a:avLst/>
@@ -8145,6 +7845,414 @@
               <a:cs typeface="Average"/>
               <a:sym typeface="Average"/>
             </a:endParaRPr>
+          </a:p>
+        </p:txBody>
+      </p:sp>
+      <p:sp>
+        <p:nvSpPr>
+          <p:cNvPr id="67" name="Google Shape;67;p14"/>
+          <p:cNvSpPr txBox="1"/>
+          <p:nvPr>
+            <p:ph idx="1" type="body"/>
+          </p:nvPr>
+        </p:nvSpPr>
+        <p:spPr>
+          <a:xfrm>
+            <a:off x="3939475" y="348525"/>
+            <a:ext cx="4795200" cy="4340700"/>
+          </a:xfrm>
+          <a:prstGeom prst="rect">
+            <a:avLst/>
+          </a:prstGeom>
+        </p:spPr>
+        <p:txBody>
+          <a:bodyPr anchorCtr="0" anchor="t" bIns="91425" lIns="91425" spcFirstLastPara="1" rIns="91425" wrap="square" tIns="91425">
+            <a:noAutofit/>
+          </a:bodyPr>
+          <a:lstStyle/>
+          <a:p>
+            <a:pPr indent="0" lvl="0" marL="0" rtl="0" algn="l">
+              <a:lnSpc>
+                <a:spcPct val="80000"/>
+              </a:lnSpc>
+              <a:spcBef>
+                <a:spcPts val="0"/>
+              </a:spcBef>
+              <a:spcAft>
+                <a:spcPts val="0"/>
+              </a:spcAft>
+              <a:buSzPts val="1018"/>
+              <a:buNone/>
+            </a:pPr>
+            <a:r>
+              <a:rPr lang="en" sz="1400"/>
+              <a:t>Ashley-</a:t>
+            </a:r>
+            <a:endParaRPr sz="1400"/>
+          </a:p>
+          <a:p>
+            <a:pPr indent="-317500" lvl="0" marL="457200" rtl="0" algn="l">
+              <a:lnSpc>
+                <a:spcPct val="80000"/>
+              </a:lnSpc>
+              <a:spcBef>
+                <a:spcPts val="1200"/>
+              </a:spcBef>
+              <a:spcAft>
+                <a:spcPts val="0"/>
+              </a:spcAft>
+              <a:buSzPts val="1400"/>
+              <a:buChar char="●"/>
+            </a:pPr>
+            <a:r>
+              <a:rPr lang="en" sz="1400"/>
+              <a:t>Gantt Chart</a:t>
+            </a:r>
+            <a:endParaRPr sz="1400"/>
+          </a:p>
+          <a:p>
+            <a:pPr indent="-317500" lvl="0" marL="457200" rtl="0" algn="l">
+              <a:lnSpc>
+                <a:spcPct val="80000"/>
+              </a:lnSpc>
+              <a:spcBef>
+                <a:spcPts val="0"/>
+              </a:spcBef>
+              <a:spcAft>
+                <a:spcPts val="0"/>
+              </a:spcAft>
+              <a:buSzPts val="1400"/>
+              <a:buChar char="●"/>
+            </a:pPr>
+            <a:r>
+              <a:rPr lang="en" sz="1400"/>
+              <a:t>Presentation / PDF Management</a:t>
+            </a:r>
+            <a:endParaRPr sz="1400"/>
+          </a:p>
+          <a:p>
+            <a:pPr indent="-317500" lvl="0" marL="457200" rtl="0" algn="l">
+              <a:lnSpc>
+                <a:spcPct val="80000"/>
+              </a:lnSpc>
+              <a:spcBef>
+                <a:spcPts val="0"/>
+              </a:spcBef>
+              <a:spcAft>
+                <a:spcPts val="0"/>
+              </a:spcAft>
+              <a:buSzPts val="1400"/>
+              <a:buChar char="●"/>
+            </a:pPr>
+            <a:r>
+              <a:rPr lang="en" sz="1400"/>
+              <a:t>Package Diagram</a:t>
+            </a:r>
+            <a:endParaRPr sz="1400"/>
+          </a:p>
+          <a:p>
+            <a:pPr indent="-317500" lvl="0" marL="457200" rtl="0" algn="l">
+              <a:lnSpc>
+                <a:spcPct val="80000"/>
+              </a:lnSpc>
+              <a:spcBef>
+                <a:spcPts val="0"/>
+              </a:spcBef>
+              <a:spcAft>
+                <a:spcPts val="0"/>
+              </a:spcAft>
+              <a:buSzPts val="1400"/>
+              <a:buChar char="●"/>
+            </a:pPr>
+            <a:r>
+              <a:rPr lang="en" sz="1400"/>
+              <a:t>Sale &amp; Customer classes</a:t>
+            </a:r>
+            <a:endParaRPr sz="1400"/>
+          </a:p>
+          <a:p>
+            <a:pPr indent="0" lvl="0" marL="0" rtl="0" algn="l">
+              <a:lnSpc>
+                <a:spcPct val="80000"/>
+              </a:lnSpc>
+              <a:spcBef>
+                <a:spcPts val="1200"/>
+              </a:spcBef>
+              <a:spcAft>
+                <a:spcPts val="0"/>
+              </a:spcAft>
+              <a:buSzPts val="1018"/>
+              <a:buNone/>
+            </a:pPr>
+            <a:r>
+              <a:rPr lang="en" sz="1400"/>
+              <a:t>Joshua-</a:t>
+            </a:r>
+            <a:endParaRPr sz="1400"/>
+          </a:p>
+          <a:p>
+            <a:pPr indent="-317500" lvl="0" marL="457200" rtl="0" algn="l">
+              <a:lnSpc>
+                <a:spcPct val="80000"/>
+              </a:lnSpc>
+              <a:spcBef>
+                <a:spcPts val="1200"/>
+              </a:spcBef>
+              <a:spcAft>
+                <a:spcPts val="0"/>
+              </a:spcAft>
+              <a:buSzPts val="1400"/>
+              <a:buChar char="●"/>
+            </a:pPr>
+            <a:r>
+              <a:rPr lang="en" sz="1400"/>
+              <a:t>Maven Project &amp; Configuration</a:t>
+            </a:r>
+            <a:endParaRPr sz="1400"/>
+          </a:p>
+          <a:p>
+            <a:pPr indent="-317500" lvl="0" marL="457200" rtl="0" algn="l">
+              <a:lnSpc>
+                <a:spcPct val="80000"/>
+              </a:lnSpc>
+              <a:spcBef>
+                <a:spcPts val="0"/>
+              </a:spcBef>
+              <a:spcAft>
+                <a:spcPts val="0"/>
+              </a:spcAft>
+              <a:buSzPts val="1400"/>
+              <a:buChar char="●"/>
+            </a:pPr>
+            <a:r>
+              <a:rPr lang="en" sz="1400"/>
+              <a:t>Project Lead / GIT Management</a:t>
+            </a:r>
+            <a:endParaRPr sz="1400"/>
+          </a:p>
+          <a:p>
+            <a:pPr indent="-317500" lvl="0" marL="457200" rtl="0" algn="l">
+              <a:lnSpc>
+                <a:spcPct val="80000"/>
+              </a:lnSpc>
+              <a:spcBef>
+                <a:spcPts val="0"/>
+              </a:spcBef>
+              <a:spcAft>
+                <a:spcPts val="0"/>
+              </a:spcAft>
+              <a:buSzPts val="1400"/>
+              <a:buChar char="●"/>
+            </a:pPr>
+            <a:r>
+              <a:rPr lang="en" sz="1400"/>
+              <a:t>Presentation</a:t>
+            </a:r>
+            <a:endParaRPr sz="1400"/>
+          </a:p>
+          <a:p>
+            <a:pPr indent="-317500" lvl="0" marL="457200" rtl="0" algn="l">
+              <a:lnSpc>
+                <a:spcPct val="80000"/>
+              </a:lnSpc>
+              <a:spcBef>
+                <a:spcPts val="0"/>
+              </a:spcBef>
+              <a:spcAft>
+                <a:spcPts val="0"/>
+              </a:spcAft>
+              <a:buSzPts val="1400"/>
+              <a:buChar char="●"/>
+            </a:pPr>
+            <a:r>
+              <a:rPr lang="en" sz="1400"/>
+              <a:t>PaymentInfo &amp; SalesLineItem classes</a:t>
+            </a:r>
+            <a:endParaRPr sz="1400"/>
+          </a:p>
+          <a:p>
+            <a:pPr indent="0" lvl="0" marL="0" rtl="0" algn="l">
+              <a:lnSpc>
+                <a:spcPct val="80000"/>
+              </a:lnSpc>
+              <a:spcBef>
+                <a:spcPts val="1200"/>
+              </a:spcBef>
+              <a:spcAft>
+                <a:spcPts val="0"/>
+              </a:spcAft>
+              <a:buSzPts val="1018"/>
+              <a:buNone/>
+            </a:pPr>
+            <a:r>
+              <a:rPr lang="en" sz="1400"/>
+              <a:t>Austin- </a:t>
+            </a:r>
+            <a:endParaRPr sz="1400"/>
+          </a:p>
+          <a:p>
+            <a:pPr indent="-317500" lvl="0" marL="457200" rtl="0" algn="l">
+              <a:lnSpc>
+                <a:spcPct val="80000"/>
+              </a:lnSpc>
+              <a:spcBef>
+                <a:spcPts val="1200"/>
+              </a:spcBef>
+              <a:spcAft>
+                <a:spcPts val="0"/>
+              </a:spcAft>
+              <a:buSzPts val="1400"/>
+              <a:buChar char="●"/>
+            </a:pPr>
+            <a:r>
+              <a:rPr lang="en" sz="1400"/>
+              <a:t>Implement JUnit tests</a:t>
+            </a:r>
+            <a:endParaRPr sz="1400"/>
+          </a:p>
+          <a:p>
+            <a:pPr indent="-317500" lvl="0" marL="457200" rtl="0" algn="l">
+              <a:lnSpc>
+                <a:spcPct val="80000"/>
+              </a:lnSpc>
+              <a:spcBef>
+                <a:spcPts val="0"/>
+              </a:spcBef>
+              <a:spcAft>
+                <a:spcPts val="0"/>
+              </a:spcAft>
+              <a:buSzPts val="1400"/>
+              <a:buChar char="●"/>
+            </a:pPr>
+            <a:r>
+              <a:rPr lang="en" sz="1400"/>
+              <a:t>Swing GUI Lead</a:t>
+            </a:r>
+            <a:endParaRPr b="1" sz="1400" u="sng"/>
+          </a:p>
+          <a:p>
+            <a:pPr indent="-317500" lvl="0" marL="457200" rtl="0" algn="l">
+              <a:lnSpc>
+                <a:spcPct val="80000"/>
+              </a:lnSpc>
+              <a:spcBef>
+                <a:spcPts val="0"/>
+              </a:spcBef>
+              <a:spcAft>
+                <a:spcPts val="0"/>
+              </a:spcAft>
+              <a:buSzPts val="1400"/>
+              <a:buChar char="●"/>
+            </a:pPr>
+            <a:r>
+              <a:rPr lang="en" sz="1400"/>
+              <a:t>Website Maintenance</a:t>
+            </a:r>
+            <a:endParaRPr sz="1400"/>
+          </a:p>
+          <a:p>
+            <a:pPr indent="-317500" lvl="0" marL="457200" rtl="0" algn="l">
+              <a:lnSpc>
+                <a:spcPct val="80000"/>
+              </a:lnSpc>
+              <a:spcBef>
+                <a:spcPts val="0"/>
+              </a:spcBef>
+              <a:spcAft>
+                <a:spcPts val="0"/>
+              </a:spcAft>
+              <a:buSzPts val="1400"/>
+              <a:buChar char="●"/>
+            </a:pPr>
+            <a:r>
+              <a:rPr lang="en" sz="1400"/>
+              <a:t>ShoppingCart &amp; Item classes</a:t>
+            </a:r>
+            <a:endParaRPr sz="1400"/>
+          </a:p>
+          <a:p>
+            <a:pPr indent="0" lvl="0" marL="0" rtl="0" algn="l">
+              <a:lnSpc>
+                <a:spcPct val="80000"/>
+              </a:lnSpc>
+              <a:spcBef>
+                <a:spcPts val="1200"/>
+              </a:spcBef>
+              <a:spcAft>
+                <a:spcPts val="0"/>
+              </a:spcAft>
+              <a:buSzPts val="1018"/>
+              <a:buNone/>
+            </a:pPr>
+            <a:r>
+              <a:rPr lang="en" sz="1400"/>
+              <a:t>Tyler- </a:t>
+            </a:r>
+            <a:endParaRPr sz="1400"/>
+          </a:p>
+          <a:p>
+            <a:pPr indent="-317500" lvl="0" marL="457200" rtl="0" algn="l">
+              <a:lnSpc>
+                <a:spcPct val="80000"/>
+              </a:lnSpc>
+              <a:spcBef>
+                <a:spcPts val="1200"/>
+              </a:spcBef>
+              <a:spcAft>
+                <a:spcPts val="0"/>
+              </a:spcAft>
+              <a:buSzPts val="1400"/>
+              <a:buChar char="●"/>
+            </a:pPr>
+            <a:r>
+              <a:rPr lang="en" sz="1400"/>
+              <a:t>Implement JUnit test</a:t>
+            </a:r>
+            <a:endParaRPr sz="1400"/>
+          </a:p>
+          <a:p>
+            <a:pPr indent="-317500" lvl="0" marL="457200" rtl="0" algn="l">
+              <a:lnSpc>
+                <a:spcPct val="80000"/>
+              </a:lnSpc>
+              <a:spcBef>
+                <a:spcPts val="0"/>
+              </a:spcBef>
+              <a:spcAft>
+                <a:spcPts val="0"/>
+              </a:spcAft>
+              <a:buSzPts val="1400"/>
+              <a:buChar char="●"/>
+            </a:pPr>
+            <a:r>
+              <a:rPr lang="en" sz="1400"/>
+              <a:t>D</a:t>
+            </a:r>
+            <a:r>
+              <a:rPr lang="en" sz="1400"/>
+              <a:t>esign Class Diagram</a:t>
+            </a:r>
+            <a:endParaRPr sz="1400"/>
+          </a:p>
+          <a:p>
+            <a:pPr indent="-317500" lvl="0" marL="457200" rtl="0" algn="l">
+              <a:lnSpc>
+                <a:spcPct val="80000"/>
+              </a:lnSpc>
+              <a:spcBef>
+                <a:spcPts val="0"/>
+              </a:spcBef>
+              <a:spcAft>
+                <a:spcPts val="0"/>
+              </a:spcAft>
+              <a:buSzPts val="1400"/>
+              <a:buChar char="●"/>
+            </a:pPr>
+            <a:r>
+              <a:rPr lang="en" sz="1400"/>
+              <a:t>ProductCatalog &amp; ProductSpecification classes</a:t>
+            </a:r>
+            <a:endParaRPr sz="1400"/>
           </a:p>
         </p:txBody>
       </p:sp>

</xml_diff>